<commit_message>
Finished part 1.1 - routing
</commit_message>
<xml_diff>
--- a/slides/part1_routing.pptx
+++ b/slides/part1_routing.pptx
@@ -6,20 +6,31 @@
     <p:sldMasterId id="2147483656" r:id="rId2"/>
   </p:sldMasterIdLst>
   <p:notesMasterIdLst>
-    <p:notesMasterId r:id="rId6"/>
+    <p:notesMasterId r:id="rId17"/>
   </p:notesMasterIdLst>
   <p:handoutMasterIdLst>
-    <p:handoutMasterId r:id="rId7"/>
+    <p:handoutMasterId r:id="rId18"/>
   </p:handoutMasterIdLst>
   <p:sldIdLst>
     <p:sldId id="676" r:id="rId3"/>
     <p:sldId id="677" r:id="rId4"/>
     <p:sldId id="678" r:id="rId5"/>
+    <p:sldId id="679" r:id="rId6"/>
+    <p:sldId id="680" r:id="rId7"/>
+    <p:sldId id="681" r:id="rId8"/>
+    <p:sldId id="682" r:id="rId9"/>
+    <p:sldId id="683" r:id="rId10"/>
+    <p:sldId id="684" r:id="rId11"/>
+    <p:sldId id="685" r:id="rId12"/>
+    <p:sldId id="686" r:id="rId13"/>
+    <p:sldId id="687" r:id="rId14"/>
+    <p:sldId id="688" r:id="rId15"/>
+    <p:sldId id="689" r:id="rId16"/>
   </p:sldIdLst>
   <p:sldSz cx="9144000" cy="6858000" type="screen4x3"/>
   <p:notesSz cx="9601200" cy="7315200"/>
   <p:custDataLst>
-    <p:tags r:id="rId8"/>
+    <p:tags r:id="rId19"/>
   </p:custDataLst>
   <p:defaultTextStyle>
     <a:defPPr>
@@ -244,7 +255,7 @@
               <a:pPr>
                 <a:defRPr/>
               </a:pPr>
-              <a:t>8/25/2010 9:02 PM</a:t>
+              <a:t>8/25/2010 9:26 PM</a:t>
             </a:fld>
             <a:endParaRPr lang="en-US"/>
           </a:p>
@@ -454,7 +465,7 @@
               <a:pPr>
                 <a:defRPr/>
               </a:pPr>
-              <a:t>8/25/2010 9:02 PM</a:t>
+              <a:t>8/25/2010 9:26 PM</a:t>
             </a:fld>
             <a:endParaRPr lang="en-US"/>
           </a:p>
@@ -854,7 +865,7 @@
             <a:fld id="{645EDAD1-88E4-4536-AD95-0BFD82EC77E6}" type="datetime8">
               <a:rPr lang="en-US" smtClean="0"/>
               <a:pPr/>
-              <a:t>8/25/2010 9:02 PM</a:t>
+              <a:t>8/25/2010 9:26 PM</a:t>
             </a:fld>
             <a:endParaRPr lang="en-US" smtClean="0"/>
           </a:p>
@@ -5380,7 +5391,6 @@
               <a:rPr lang="en-US" noProof="0" smtClean="0"/>
               <a:t>Click icon to add picture</a:t>
             </a:r>
-            <a:endParaRPr lang="en-US" noProof="0" smtClean="0"/>
           </a:p>
         </p:txBody>
       </p:sp>
@@ -5637,7 +5647,6 @@
               <a:rPr lang="en-US" smtClean="0"/>
               <a:t>Fifth level</a:t>
             </a:r>
-            <a:endParaRPr lang="en-US" smtClean="0"/>
           </a:p>
         </p:txBody>
       </p:sp>
@@ -7057,11 +7066,7 @@
             </a:br>
             <a:r>
               <a:rPr lang="en-US" sz="4600" b="1" smtClean="0"/>
-              <a:t>Part 1: </a:t>
-            </a:r>
-            <a:r>
-              <a:rPr lang="en-US" sz="4600" b="1" smtClean="0"/>
-              <a:t>Routing</a:t>
+              <a:t>Part 1: Routing</a:t>
             </a:r>
             <a:endParaRPr lang="en-US" sz="4600" b="1" dirty="0" smtClean="0">
               <a:solidFill>
@@ -7115,6 +7120,964 @@
               </a:rPr>
               <a:t>javier@lozanotek.com</a:t>
             </a:r>
+          </a:p>
+        </p:txBody>
+      </p:sp>
+    </p:spTree>
+  </p:cSld>
+  <p:clrMapOvr>
+    <a:masterClrMapping/>
+  </p:clrMapOvr>
+  <p:transition>
+    <p:fade/>
+  </p:transition>
+  <p:timing>
+    <p:tnLst>
+      <p:par>
+        <p:cTn id="1" dur="indefinite" restart="never" nodeType="tmRoot"/>
+      </p:par>
+    </p:tnLst>
+  </p:timing>
+</p:sld>
+</file>
+
+<file path=ppt/slides/slide10.xml><?xml version="1.0" encoding="utf-8"?>
+<p:sld xmlns:a="http://schemas.openxmlformats.org/drawingml/2006/main" xmlns:r="http://schemas.openxmlformats.org/officeDocument/2006/relationships" xmlns:p="http://schemas.openxmlformats.org/presentationml/2006/main">
+  <p:cSld>
+    <p:spTree>
+      <p:nvGrpSpPr>
+        <p:cNvPr id="1" name=""/>
+        <p:cNvGrpSpPr/>
+        <p:nvPr/>
+      </p:nvGrpSpPr>
+      <p:grpSpPr>
+        <a:xfrm>
+          <a:off x="0" y="0"/>
+          <a:ext cx="0" cy="0"/>
+          <a:chOff x="0" y="0"/>
+          <a:chExt cx="0" cy="0"/>
+        </a:xfrm>
+      </p:grpSpPr>
+      <p:sp>
+        <p:nvSpPr>
+          <p:cNvPr id="2" name="Title 1"/>
+          <p:cNvSpPr>
+            <a:spLocks noGrp="1"/>
+          </p:cNvSpPr>
+          <p:nvPr>
+            <p:ph type="title"/>
+          </p:nvPr>
+        </p:nvSpPr>
+        <p:spPr/>
+        <p:txBody>
+          <a:bodyPr/>
+          <a:lstStyle/>
+          <a:p>
+            <a:r>
+              <a:rPr lang="en-US" b="1" dirty="0" smtClean="0"/>
+              <a:t>Defaults</a:t>
+            </a:r>
+            <a:endParaRPr lang="en-US" b="1" dirty="0"/>
+          </a:p>
+        </p:txBody>
+      </p:sp>
+      <p:sp>
+        <p:nvSpPr>
+          <p:cNvPr id="3" name="Content Placeholder 2"/>
+          <p:cNvSpPr>
+            <a:spLocks noGrp="1"/>
+          </p:cNvSpPr>
+          <p:nvPr>
+            <p:ph idx="1"/>
+          </p:nvPr>
+        </p:nvSpPr>
+        <p:spPr>
+          <a:xfrm>
+            <a:off x="381002" y="1417638"/>
+            <a:ext cx="8410575" cy="4616648"/>
+          </a:xfrm>
+        </p:spPr>
+        <p:txBody>
+          <a:bodyPr/>
+          <a:lstStyle/>
+          <a:p>
+            <a:r>
+              <a:rPr lang="en-US" dirty="0" smtClean="0"/>
+              <a:t>You can also specify no default value</a:t>
+            </a:r>
+          </a:p>
+          <a:p>
+            <a:pPr lvl="1"/>
+            <a:r>
+              <a:rPr lang="en-US" b="1" dirty="0" smtClean="0"/>
+              <a:t>http://example.com/{controller}/{action}/{id</a:t>
+            </a:r>
+            <a:r>
+              <a:rPr lang="en-US" b="1" dirty="0" smtClean="0"/>
+              <a:t>}</a:t>
+            </a:r>
+          </a:p>
+          <a:p>
+            <a:pPr lvl="2">
+              <a:buNone/>
+            </a:pPr>
+            <a:r>
+              <a:rPr lang="en-US" i="1" dirty="0" smtClean="0"/>
+              <a:t>	</a:t>
+            </a:r>
+          </a:p>
+          <a:p>
+            <a:pPr lvl="2">
+              <a:buNone/>
+            </a:pPr>
+            <a:r>
+              <a:rPr lang="en-US" i="1" dirty="0" smtClean="0">
+                <a:latin typeface="Consolas" pitchFamily="49" charset="0"/>
+                <a:cs typeface="Consolas" pitchFamily="49" charset="0"/>
+              </a:rPr>
+              <a:t>	</a:t>
+            </a:r>
+            <a:r>
+              <a:rPr lang="en-US" dirty="0" smtClean="0">
+                <a:latin typeface="Consolas" pitchFamily="49" charset="0"/>
+                <a:cs typeface="Consolas" pitchFamily="49" charset="0"/>
+              </a:rPr>
+              <a:t>new { </a:t>
+            </a:r>
+          </a:p>
+          <a:p>
+            <a:pPr lvl="3">
+              <a:buNone/>
+            </a:pPr>
+            <a:r>
+              <a:rPr lang="en-US" sz="2400" dirty="0" smtClean="0">
+                <a:latin typeface="Consolas" pitchFamily="49" charset="0"/>
+                <a:cs typeface="Consolas" pitchFamily="49" charset="0"/>
+              </a:rPr>
+              <a:t>	controller = “home”,</a:t>
+            </a:r>
+          </a:p>
+          <a:p>
+            <a:pPr lvl="3">
+              <a:buNone/>
+            </a:pPr>
+            <a:r>
+              <a:rPr lang="en-US" sz="2400" dirty="0" smtClean="0">
+                <a:latin typeface="Consolas" pitchFamily="49" charset="0"/>
+                <a:cs typeface="Consolas" pitchFamily="49" charset="0"/>
+              </a:rPr>
+              <a:t>	action = “index”,</a:t>
+            </a:r>
+          </a:p>
+          <a:p>
+            <a:pPr lvl="3">
+              <a:buNone/>
+            </a:pPr>
+            <a:r>
+              <a:rPr lang="en-US" sz="2400" dirty="0" smtClean="0">
+                <a:latin typeface="Consolas" pitchFamily="49" charset="0"/>
+                <a:cs typeface="Consolas" pitchFamily="49" charset="0"/>
+              </a:rPr>
+              <a:t>	id = </a:t>
+            </a:r>
+            <a:r>
+              <a:rPr lang="en-US" sz="2400" dirty="0" err="1" smtClean="0">
+                <a:latin typeface="Consolas" pitchFamily="49" charset="0"/>
+                <a:cs typeface="Consolas" pitchFamily="49" charset="0"/>
+              </a:rPr>
+              <a:t>UrlParameter.Optional</a:t>
+            </a:r>
+            <a:r>
+              <a:rPr lang="en-US" sz="2400" dirty="0" smtClean="0">
+                <a:latin typeface="Consolas" pitchFamily="49" charset="0"/>
+                <a:cs typeface="Consolas" pitchFamily="49" charset="0"/>
+              </a:rPr>
+              <a:t> };</a:t>
+            </a:r>
+            <a:endParaRPr lang="en-US" sz="2400" i="1" dirty="0" smtClean="0">
+              <a:latin typeface="Consolas" pitchFamily="49" charset="0"/>
+              <a:cs typeface="Consolas" pitchFamily="49" charset="0"/>
+            </a:endParaRPr>
+          </a:p>
+          <a:p>
+            <a:pPr lvl="3">
+              <a:buNone/>
+            </a:pPr>
+            <a:endParaRPr lang="en-US" sz="2400" i="1" dirty="0" smtClean="0">
+              <a:latin typeface="Consolas" pitchFamily="49" charset="0"/>
+              <a:cs typeface="Consolas" pitchFamily="49" charset="0"/>
+            </a:endParaRPr>
+          </a:p>
+          <a:p>
+            <a:pPr lvl="1"/>
+            <a:r>
+              <a:rPr lang="en-US" dirty="0" smtClean="0"/>
+              <a:t>If no value is found from URL, then Routing will not supply one to the action method</a:t>
+            </a:r>
+            <a:endParaRPr lang="en-US" dirty="0"/>
+          </a:p>
+        </p:txBody>
+      </p:sp>
+      <p:sp>
+        <p:nvSpPr>
+          <p:cNvPr id="4" name="Slide Number Placeholder 3"/>
+          <p:cNvSpPr>
+            <a:spLocks noGrp="1"/>
+          </p:cNvSpPr>
+          <p:nvPr>
+            <p:ph type="sldNum" sz="quarter" idx="10"/>
+          </p:nvPr>
+        </p:nvSpPr>
+        <p:spPr/>
+        <p:txBody>
+          <a:bodyPr/>
+          <a:lstStyle/>
+          <a:p>
+            <a:pPr>
+              <a:defRPr/>
+            </a:pPr>
+            <a:fld id="{B63753EC-566D-40B0-951D-58F31B9256E5}" type="slidenum">
+              <a:rPr lang="en-US" smtClean="0"/>
+              <a:pPr>
+                <a:defRPr/>
+              </a:pPr>
+              <a:t>10</a:t>
+            </a:fld>
+            <a:endParaRPr lang="en-US"/>
+          </a:p>
+        </p:txBody>
+      </p:sp>
+    </p:spTree>
+  </p:cSld>
+  <p:clrMapOvr>
+    <a:masterClrMapping/>
+  </p:clrMapOvr>
+  <p:transition>
+    <p:fade/>
+  </p:transition>
+  <p:timing>
+    <p:tnLst>
+      <p:par>
+        <p:cTn id="1" dur="indefinite" restart="never" nodeType="tmRoot"/>
+      </p:par>
+    </p:tnLst>
+  </p:timing>
+</p:sld>
+</file>
+
+<file path=ppt/slides/slide11.xml><?xml version="1.0" encoding="utf-8"?>
+<p:sld xmlns:a="http://schemas.openxmlformats.org/drawingml/2006/main" xmlns:r="http://schemas.openxmlformats.org/officeDocument/2006/relationships" xmlns:p="http://schemas.openxmlformats.org/presentationml/2006/main">
+  <p:cSld>
+    <p:spTree>
+      <p:nvGrpSpPr>
+        <p:cNvPr id="1" name=""/>
+        <p:cNvGrpSpPr/>
+        <p:nvPr/>
+      </p:nvGrpSpPr>
+      <p:grpSpPr>
+        <a:xfrm>
+          <a:off x="0" y="0"/>
+          <a:ext cx="0" cy="0"/>
+          <a:chOff x="0" y="0"/>
+          <a:chExt cx="0" cy="0"/>
+        </a:xfrm>
+      </p:grpSpPr>
+      <p:sp>
+        <p:nvSpPr>
+          <p:cNvPr id="2" name="Title 1"/>
+          <p:cNvSpPr>
+            <a:spLocks noGrp="1"/>
+          </p:cNvSpPr>
+          <p:nvPr>
+            <p:ph type="title"/>
+          </p:nvPr>
+        </p:nvSpPr>
+        <p:spPr/>
+        <p:txBody>
+          <a:bodyPr/>
+          <a:lstStyle/>
+          <a:p>
+            <a:r>
+              <a:rPr lang="en-US" b="1" dirty="0" smtClean="0"/>
+              <a:t>Constraints</a:t>
+            </a:r>
+            <a:endParaRPr lang="en-US" b="1" dirty="0"/>
+          </a:p>
+        </p:txBody>
+      </p:sp>
+      <p:sp>
+        <p:nvSpPr>
+          <p:cNvPr id="3" name="Content Placeholder 2"/>
+          <p:cNvSpPr>
+            <a:spLocks noGrp="1"/>
+          </p:cNvSpPr>
+          <p:nvPr>
+            <p:ph idx="1"/>
+          </p:nvPr>
+        </p:nvSpPr>
+        <p:spPr>
+          <a:xfrm>
+            <a:off x="381002" y="1417638"/>
+            <a:ext cx="8410575" cy="2899255"/>
+          </a:xfrm>
+        </p:spPr>
+        <p:txBody>
+          <a:bodyPr/>
+          <a:lstStyle/>
+          <a:p>
+            <a:r>
+              <a:rPr lang="en-US" dirty="0" smtClean="0"/>
+              <a:t>Allows to check the HTTP method used</a:t>
+            </a:r>
+          </a:p>
+          <a:p>
+            <a:pPr lvl="1"/>
+            <a:r>
+              <a:rPr lang="en-US" dirty="0" smtClean="0"/>
+              <a:t>Only allow GET for this route</a:t>
+            </a:r>
+          </a:p>
+          <a:p>
+            <a:pPr lvl="1"/>
+            <a:r>
+              <a:rPr lang="en-US" dirty="0" smtClean="0"/>
+              <a:t>Only allow POST for this other route</a:t>
+            </a:r>
+          </a:p>
+          <a:p>
+            <a:pPr lvl="2">
+              <a:buNone/>
+            </a:pPr>
+            <a:r>
+              <a:rPr lang="en-US" i="1" dirty="0" smtClean="0">
+                <a:latin typeface="Consolas" pitchFamily="49" charset="0"/>
+                <a:cs typeface="Consolas" pitchFamily="49" charset="0"/>
+              </a:rPr>
+              <a:t>	</a:t>
+            </a:r>
+          </a:p>
+          <a:p>
+            <a:pPr lvl="2">
+              <a:buNone/>
+            </a:pPr>
+            <a:r>
+              <a:rPr lang="en-US" i="1" dirty="0" smtClean="0">
+                <a:latin typeface="Consolas" pitchFamily="49" charset="0"/>
+                <a:cs typeface="Consolas" pitchFamily="49" charset="0"/>
+              </a:rPr>
+              <a:t>	</a:t>
+            </a:r>
+            <a:r>
+              <a:rPr lang="en-US" dirty="0" smtClean="0">
+                <a:latin typeface="Consolas" pitchFamily="49" charset="0"/>
+                <a:cs typeface="Consolas" pitchFamily="49" charset="0"/>
+              </a:rPr>
+              <a:t>new { </a:t>
+            </a:r>
+            <a:r>
+              <a:rPr lang="en-US" dirty="0" err="1" smtClean="0">
+                <a:latin typeface="Consolas" pitchFamily="49" charset="0"/>
+                <a:cs typeface="Consolas" pitchFamily="49" charset="0"/>
+              </a:rPr>
+              <a:t>httpMethod</a:t>
+            </a:r>
+            <a:r>
+              <a:rPr lang="en-US" dirty="0" smtClean="0">
+                <a:latin typeface="Consolas" pitchFamily="49" charset="0"/>
+                <a:cs typeface="Consolas" pitchFamily="49" charset="0"/>
+              </a:rPr>
+              <a:t> = </a:t>
+            </a:r>
+          </a:p>
+          <a:p>
+            <a:pPr lvl="2">
+              <a:buNone/>
+            </a:pPr>
+            <a:r>
+              <a:rPr lang="en-US" dirty="0" smtClean="0">
+                <a:latin typeface="Consolas" pitchFamily="49" charset="0"/>
+                <a:cs typeface="Consolas" pitchFamily="49" charset="0"/>
+              </a:rPr>
+              <a:t>	</a:t>
+            </a:r>
+            <a:r>
+              <a:rPr lang="en-US" dirty="0" smtClean="0">
+                <a:latin typeface="Consolas" pitchFamily="49" charset="0"/>
+                <a:cs typeface="Consolas" pitchFamily="49" charset="0"/>
+              </a:rPr>
+              <a:t>	new </a:t>
+            </a:r>
+            <a:r>
+              <a:rPr lang="en-US" dirty="0" err="1" smtClean="0">
+                <a:latin typeface="Consolas" pitchFamily="49" charset="0"/>
+                <a:cs typeface="Consolas" pitchFamily="49" charset="0"/>
+              </a:rPr>
+              <a:t>HttpMethodConstraint</a:t>
+            </a:r>
+            <a:r>
+              <a:rPr lang="en-US" dirty="0" smtClean="0">
+                <a:latin typeface="Consolas" pitchFamily="49" charset="0"/>
+                <a:cs typeface="Consolas" pitchFamily="49" charset="0"/>
+              </a:rPr>
+              <a:t>(“GET”) }</a:t>
+            </a:r>
+            <a:endParaRPr lang="en-US" dirty="0">
+              <a:latin typeface="Consolas" pitchFamily="49" charset="0"/>
+              <a:cs typeface="Consolas" pitchFamily="49" charset="0"/>
+            </a:endParaRPr>
+          </a:p>
+        </p:txBody>
+      </p:sp>
+      <p:sp>
+        <p:nvSpPr>
+          <p:cNvPr id="4" name="Slide Number Placeholder 3"/>
+          <p:cNvSpPr>
+            <a:spLocks noGrp="1"/>
+          </p:cNvSpPr>
+          <p:nvPr>
+            <p:ph type="sldNum" sz="quarter" idx="10"/>
+          </p:nvPr>
+        </p:nvSpPr>
+        <p:spPr/>
+        <p:txBody>
+          <a:bodyPr/>
+          <a:lstStyle/>
+          <a:p>
+            <a:pPr>
+              <a:defRPr/>
+            </a:pPr>
+            <a:fld id="{B63753EC-566D-40B0-951D-58F31B9256E5}" type="slidenum">
+              <a:rPr lang="en-US" smtClean="0"/>
+              <a:pPr>
+                <a:defRPr/>
+              </a:pPr>
+              <a:t>11</a:t>
+            </a:fld>
+            <a:endParaRPr lang="en-US"/>
+          </a:p>
+        </p:txBody>
+      </p:sp>
+    </p:spTree>
+  </p:cSld>
+  <p:clrMapOvr>
+    <a:masterClrMapping/>
+  </p:clrMapOvr>
+  <p:transition>
+    <p:fade/>
+  </p:transition>
+  <p:timing>
+    <p:tnLst>
+      <p:par>
+        <p:cTn id="1" dur="indefinite" restart="never" nodeType="tmRoot"/>
+      </p:par>
+    </p:tnLst>
+  </p:timing>
+</p:sld>
+</file>
+
+<file path=ppt/slides/slide12.xml><?xml version="1.0" encoding="utf-8"?>
+<p:sld xmlns:a="http://schemas.openxmlformats.org/drawingml/2006/main" xmlns:r="http://schemas.openxmlformats.org/officeDocument/2006/relationships" xmlns:p="http://schemas.openxmlformats.org/presentationml/2006/main">
+  <p:cSld>
+    <p:spTree>
+      <p:nvGrpSpPr>
+        <p:cNvPr id="1" name=""/>
+        <p:cNvGrpSpPr/>
+        <p:nvPr/>
+      </p:nvGrpSpPr>
+      <p:grpSpPr>
+        <a:xfrm>
+          <a:off x="0" y="0"/>
+          <a:ext cx="0" cy="0"/>
+          <a:chOff x="0" y="0"/>
+          <a:chExt cx="0" cy="0"/>
+        </a:xfrm>
+      </p:grpSpPr>
+      <p:sp>
+        <p:nvSpPr>
+          <p:cNvPr id="2" name="Title 1"/>
+          <p:cNvSpPr>
+            <a:spLocks noGrp="1"/>
+          </p:cNvSpPr>
+          <p:nvPr>
+            <p:ph type="title"/>
+          </p:nvPr>
+        </p:nvSpPr>
+        <p:spPr/>
+        <p:txBody>
+          <a:bodyPr/>
+          <a:lstStyle/>
+          <a:p>
+            <a:r>
+              <a:rPr lang="en-US" b="1" dirty="0" smtClean="0"/>
+              <a:t>Constraints</a:t>
+            </a:r>
+            <a:endParaRPr lang="en-US" b="1" dirty="0"/>
+          </a:p>
+        </p:txBody>
+      </p:sp>
+      <p:sp>
+        <p:nvSpPr>
+          <p:cNvPr id="3" name="Content Placeholder 2"/>
+          <p:cNvSpPr>
+            <a:spLocks noGrp="1"/>
+          </p:cNvSpPr>
+          <p:nvPr>
+            <p:ph idx="1"/>
+          </p:nvPr>
+        </p:nvSpPr>
+        <p:spPr>
+          <a:xfrm>
+            <a:off x="381002" y="1417638"/>
+            <a:ext cx="8410575" cy="3342453"/>
+          </a:xfrm>
+        </p:spPr>
+        <p:txBody>
+          <a:bodyPr/>
+          <a:lstStyle/>
+          <a:p>
+            <a:r>
+              <a:rPr lang="en-US" dirty="0" smtClean="0"/>
+              <a:t>Allows to check the </a:t>
+            </a:r>
+            <a:r>
+              <a:rPr lang="en-US" i="1" dirty="0" smtClean="0"/>
+              <a:t>value</a:t>
+            </a:r>
+            <a:r>
+              <a:rPr lang="en-US" dirty="0" smtClean="0"/>
+              <a:t> of the parameter with the use of regular expressions</a:t>
+            </a:r>
+          </a:p>
+          <a:p>
+            <a:pPr lvl="1"/>
+            <a:r>
+              <a:rPr lang="en-US" b="1" dirty="0" smtClean="0"/>
+              <a:t>{id}</a:t>
+            </a:r>
+            <a:r>
+              <a:rPr lang="en-US" dirty="0" smtClean="0"/>
+              <a:t> – should be numeric</a:t>
+            </a:r>
+          </a:p>
+          <a:p>
+            <a:pPr lvl="1"/>
+            <a:r>
+              <a:rPr lang="en-US" b="1" dirty="0" smtClean="0"/>
+              <a:t>{id}</a:t>
+            </a:r>
+            <a:r>
+              <a:rPr lang="en-US" dirty="0" smtClean="0"/>
+              <a:t> – length of number should be at most 6</a:t>
+            </a:r>
+          </a:p>
+          <a:p>
+            <a:pPr lvl="2">
+              <a:buNone/>
+            </a:pPr>
+            <a:r>
+              <a:rPr lang="en-US" dirty="0" smtClean="0"/>
+              <a:t>	</a:t>
+            </a:r>
+          </a:p>
+          <a:p>
+            <a:pPr lvl="2">
+              <a:buNone/>
+            </a:pPr>
+            <a:r>
+              <a:rPr lang="en-US" dirty="0" smtClean="0">
+                <a:latin typeface="Consolas" pitchFamily="49" charset="0"/>
+                <a:cs typeface="Consolas" pitchFamily="49" charset="0"/>
+              </a:rPr>
+              <a:t>	</a:t>
+            </a:r>
+            <a:r>
+              <a:rPr lang="en-US" dirty="0" smtClean="0">
+                <a:latin typeface="Consolas" pitchFamily="49" charset="0"/>
+                <a:cs typeface="Consolas" pitchFamily="49" charset="0"/>
+              </a:rPr>
+              <a:t>new { id = @”\d{1,6}” }</a:t>
+            </a:r>
+          </a:p>
+          <a:p>
+            <a:pPr lvl="2"/>
+            <a:endParaRPr lang="en-US" dirty="0"/>
+          </a:p>
+        </p:txBody>
+      </p:sp>
+      <p:sp>
+        <p:nvSpPr>
+          <p:cNvPr id="4" name="Slide Number Placeholder 3"/>
+          <p:cNvSpPr>
+            <a:spLocks noGrp="1"/>
+          </p:cNvSpPr>
+          <p:nvPr>
+            <p:ph type="sldNum" sz="quarter" idx="10"/>
+          </p:nvPr>
+        </p:nvSpPr>
+        <p:spPr/>
+        <p:txBody>
+          <a:bodyPr/>
+          <a:lstStyle/>
+          <a:p>
+            <a:pPr>
+              <a:defRPr/>
+            </a:pPr>
+            <a:fld id="{B63753EC-566D-40B0-951D-58F31B9256E5}" type="slidenum">
+              <a:rPr lang="en-US" smtClean="0"/>
+              <a:pPr>
+                <a:defRPr/>
+              </a:pPr>
+              <a:t>12</a:t>
+            </a:fld>
+            <a:endParaRPr lang="en-US"/>
+          </a:p>
+        </p:txBody>
+      </p:sp>
+    </p:spTree>
+  </p:cSld>
+  <p:clrMapOvr>
+    <a:masterClrMapping/>
+  </p:clrMapOvr>
+  <p:transition>
+    <p:fade/>
+  </p:transition>
+  <p:timing>
+    <p:tnLst>
+      <p:par>
+        <p:cTn id="1" dur="indefinite" restart="never" nodeType="tmRoot"/>
+      </p:par>
+    </p:tnLst>
+  </p:timing>
+</p:sld>
+</file>
+
+<file path=ppt/slides/slide13.xml><?xml version="1.0" encoding="utf-8"?>
+<p:sld xmlns:a="http://schemas.openxmlformats.org/drawingml/2006/main" xmlns:r="http://schemas.openxmlformats.org/officeDocument/2006/relationships" xmlns:p="http://schemas.openxmlformats.org/presentationml/2006/main">
+  <p:cSld>
+    <p:spTree>
+      <p:nvGrpSpPr>
+        <p:cNvPr id="1" name=""/>
+        <p:cNvGrpSpPr/>
+        <p:nvPr/>
+      </p:nvGrpSpPr>
+      <p:grpSpPr>
+        <a:xfrm>
+          <a:off x="0" y="0"/>
+          <a:ext cx="0" cy="0"/>
+          <a:chOff x="0" y="0"/>
+          <a:chExt cx="0" cy="0"/>
+        </a:xfrm>
+      </p:grpSpPr>
+      <p:sp>
+        <p:nvSpPr>
+          <p:cNvPr id="2" name="Title 1"/>
+          <p:cNvSpPr>
+            <a:spLocks noGrp="1"/>
+          </p:cNvSpPr>
+          <p:nvPr>
+            <p:ph type="title"/>
+          </p:nvPr>
+        </p:nvSpPr>
+        <p:spPr/>
+        <p:txBody>
+          <a:bodyPr/>
+          <a:lstStyle/>
+          <a:p>
+            <a:r>
+              <a:rPr lang="en-US" b="1" dirty="0" smtClean="0"/>
+              <a:t>Constraints</a:t>
+            </a:r>
+            <a:endParaRPr lang="en-US" b="1" dirty="0"/>
+          </a:p>
+        </p:txBody>
+      </p:sp>
+      <p:sp>
+        <p:nvSpPr>
+          <p:cNvPr id="3" name="Content Placeholder 2"/>
+          <p:cNvSpPr>
+            <a:spLocks noGrp="1"/>
+          </p:cNvSpPr>
+          <p:nvPr>
+            <p:ph idx="1"/>
+          </p:nvPr>
+        </p:nvSpPr>
+        <p:spPr>
+          <a:xfrm>
+            <a:off x="381002" y="1417638"/>
+            <a:ext cx="8410575" cy="3416320"/>
+          </a:xfrm>
+        </p:spPr>
+        <p:txBody>
+          <a:bodyPr/>
+          <a:lstStyle/>
+          <a:p>
+            <a:r>
+              <a:rPr lang="en-US" dirty="0" smtClean="0"/>
+              <a:t>Allows to have custom constraints via </a:t>
+            </a:r>
+            <a:r>
+              <a:rPr lang="en-US" dirty="0" err="1" smtClean="0"/>
+              <a:t>IRouteConstraint</a:t>
+            </a:r>
+            <a:endParaRPr lang="en-US" dirty="0" smtClean="0"/>
+          </a:p>
+          <a:p>
+            <a:pPr>
+              <a:buNone/>
+            </a:pPr>
+            <a:endParaRPr lang="en-US" dirty="0" smtClean="0">
+              <a:latin typeface="Consolas" pitchFamily="49" charset="0"/>
+              <a:cs typeface="Consolas" pitchFamily="49" charset="0"/>
+            </a:endParaRPr>
+          </a:p>
+          <a:p>
+            <a:pPr lvl="1">
+              <a:buNone/>
+            </a:pPr>
+            <a:r>
+              <a:rPr lang="en-US" sz="2400" dirty="0" smtClean="0">
+                <a:latin typeface="Consolas" pitchFamily="49" charset="0"/>
+                <a:cs typeface="Consolas" pitchFamily="49" charset="0"/>
+              </a:rPr>
+              <a:t>class </a:t>
+            </a:r>
+            <a:r>
+              <a:rPr lang="en-US" sz="2400" dirty="0" err="1" smtClean="0">
+                <a:latin typeface="Consolas" pitchFamily="49" charset="0"/>
+                <a:cs typeface="Consolas" pitchFamily="49" charset="0"/>
+              </a:rPr>
+              <a:t>CustomConstraint</a:t>
+            </a:r>
+            <a:r>
+              <a:rPr lang="en-US" sz="2400" dirty="0" smtClean="0">
+                <a:latin typeface="Consolas" pitchFamily="49" charset="0"/>
+                <a:cs typeface="Consolas" pitchFamily="49" charset="0"/>
+              </a:rPr>
+              <a:t> : </a:t>
+            </a:r>
+            <a:r>
+              <a:rPr lang="en-US" sz="2400" dirty="0" err="1" smtClean="0">
+                <a:latin typeface="Consolas" pitchFamily="49" charset="0"/>
+                <a:cs typeface="Consolas" pitchFamily="49" charset="0"/>
+              </a:rPr>
+              <a:t>IRouteConstraint</a:t>
+            </a:r>
+            <a:r>
+              <a:rPr lang="en-US" sz="2400" dirty="0" smtClean="0">
+                <a:latin typeface="Consolas" pitchFamily="49" charset="0"/>
+                <a:cs typeface="Consolas" pitchFamily="49" charset="0"/>
+              </a:rPr>
+              <a:t> {</a:t>
+            </a:r>
+          </a:p>
+          <a:p>
+            <a:pPr lvl="2">
+              <a:buNone/>
+            </a:pPr>
+            <a:r>
+              <a:rPr lang="en-US" dirty="0" err="1" smtClean="0">
+                <a:latin typeface="Consolas" pitchFamily="49" charset="0"/>
+                <a:cs typeface="Consolas" pitchFamily="49" charset="0"/>
+              </a:rPr>
+              <a:t>bool</a:t>
+            </a:r>
+            <a:r>
+              <a:rPr lang="en-US" dirty="0" smtClean="0">
+                <a:latin typeface="Consolas" pitchFamily="49" charset="0"/>
+                <a:cs typeface="Consolas" pitchFamily="49" charset="0"/>
+              </a:rPr>
+              <a:t> Match(</a:t>
+            </a:r>
+            <a:r>
+              <a:rPr lang="en-US" dirty="0" err="1" smtClean="0">
+                <a:latin typeface="Consolas" pitchFamily="49" charset="0"/>
+                <a:cs typeface="Consolas" pitchFamily="49" charset="0"/>
+              </a:rPr>
+              <a:t>HttpContextBase</a:t>
+            </a:r>
+            <a:r>
+              <a:rPr lang="en-US" dirty="0" smtClean="0">
+                <a:latin typeface="Consolas" pitchFamily="49" charset="0"/>
+                <a:cs typeface="Consolas" pitchFamily="49" charset="0"/>
+              </a:rPr>
+              <a:t>, Route,...)</a:t>
+            </a:r>
+            <a:endParaRPr lang="en-US" dirty="0" smtClean="0">
+              <a:latin typeface="Consolas" pitchFamily="49" charset="0"/>
+              <a:cs typeface="Consolas" pitchFamily="49" charset="0"/>
+            </a:endParaRPr>
+          </a:p>
+          <a:p>
+            <a:pPr lvl="1">
+              <a:buNone/>
+            </a:pPr>
+            <a:r>
+              <a:rPr lang="en-US" sz="2400" dirty="0" smtClean="0">
+                <a:latin typeface="Consolas" pitchFamily="49" charset="0"/>
+                <a:cs typeface="Consolas" pitchFamily="49" charset="0"/>
+              </a:rPr>
+              <a:t>}</a:t>
+            </a:r>
+          </a:p>
+          <a:p>
+            <a:pPr lvl="1">
+              <a:buNone/>
+            </a:pPr>
+            <a:endParaRPr lang="en-US" sz="2400" dirty="0" smtClean="0">
+              <a:latin typeface="Consolas" pitchFamily="49" charset="0"/>
+              <a:cs typeface="Consolas" pitchFamily="49" charset="0"/>
+            </a:endParaRPr>
+          </a:p>
+        </p:txBody>
+      </p:sp>
+      <p:sp>
+        <p:nvSpPr>
+          <p:cNvPr id="4" name="Slide Number Placeholder 3"/>
+          <p:cNvSpPr>
+            <a:spLocks noGrp="1"/>
+          </p:cNvSpPr>
+          <p:nvPr>
+            <p:ph type="sldNum" sz="quarter" idx="10"/>
+          </p:nvPr>
+        </p:nvSpPr>
+        <p:spPr/>
+        <p:txBody>
+          <a:bodyPr/>
+          <a:lstStyle/>
+          <a:p>
+            <a:pPr>
+              <a:defRPr/>
+            </a:pPr>
+            <a:fld id="{B63753EC-566D-40B0-951D-58F31B9256E5}" type="slidenum">
+              <a:rPr lang="en-US" smtClean="0"/>
+              <a:pPr>
+                <a:defRPr/>
+              </a:pPr>
+              <a:t>13</a:t>
+            </a:fld>
+            <a:endParaRPr lang="en-US"/>
+          </a:p>
+        </p:txBody>
+      </p:sp>
+    </p:spTree>
+  </p:cSld>
+  <p:clrMapOvr>
+    <a:masterClrMapping/>
+  </p:clrMapOvr>
+  <p:transition>
+    <p:fade/>
+  </p:transition>
+  <p:timing>
+    <p:tnLst>
+      <p:par>
+        <p:cTn id="1" dur="indefinite" restart="never" nodeType="tmRoot"/>
+      </p:par>
+    </p:tnLst>
+  </p:timing>
+</p:sld>
+</file>
+
+<file path=ppt/slides/slide14.xml><?xml version="1.0" encoding="utf-8"?>
+<p:sld xmlns:a="http://schemas.openxmlformats.org/drawingml/2006/main" xmlns:r="http://schemas.openxmlformats.org/officeDocument/2006/relationships" xmlns:p="http://schemas.openxmlformats.org/presentationml/2006/main">
+  <p:cSld>
+    <p:spTree>
+      <p:nvGrpSpPr>
+        <p:cNvPr id="1" name=""/>
+        <p:cNvGrpSpPr/>
+        <p:nvPr/>
+      </p:nvGrpSpPr>
+      <p:grpSpPr>
+        <a:xfrm>
+          <a:off x="0" y="0"/>
+          <a:ext cx="0" cy="0"/>
+          <a:chOff x="0" y="0"/>
+          <a:chExt cx="0" cy="0"/>
+        </a:xfrm>
+      </p:grpSpPr>
+      <p:sp>
+        <p:nvSpPr>
+          <p:cNvPr id="2" name="Title 1"/>
+          <p:cNvSpPr>
+            <a:spLocks noGrp="1"/>
+          </p:cNvSpPr>
+          <p:nvPr>
+            <p:ph type="title"/>
+          </p:nvPr>
+        </p:nvSpPr>
+        <p:spPr/>
+        <p:txBody>
+          <a:bodyPr/>
+          <a:lstStyle/>
+          <a:p>
+            <a:r>
+              <a:rPr lang="en-US" b="1" smtClean="0"/>
+              <a:t>Quick Sample </a:t>
+            </a:r>
+            <a:r>
+              <a:rPr lang="en-US" b="1" dirty="0" smtClean="0"/>
+              <a:t>– JSON Routing</a:t>
+            </a:r>
+            <a:endParaRPr lang="en-US" b="1" dirty="0"/>
+          </a:p>
+        </p:txBody>
+      </p:sp>
+      <p:sp>
+        <p:nvSpPr>
+          <p:cNvPr id="4" name="Slide Number Placeholder 3"/>
+          <p:cNvSpPr>
+            <a:spLocks noGrp="1"/>
+          </p:cNvSpPr>
+          <p:nvPr>
+            <p:ph type="sldNum" sz="quarter" idx="10"/>
+          </p:nvPr>
+        </p:nvSpPr>
+        <p:spPr/>
+        <p:txBody>
+          <a:bodyPr/>
+          <a:lstStyle/>
+          <a:p>
+            <a:pPr>
+              <a:defRPr/>
+            </a:pPr>
+            <a:fld id="{B63753EC-566D-40B0-951D-58F31B9256E5}" type="slidenum">
+              <a:rPr lang="en-US" smtClean="0"/>
+              <a:pPr>
+                <a:defRPr/>
+              </a:pPr>
+              <a:t>14</a:t>
+            </a:fld>
+            <a:endParaRPr lang="en-US"/>
+          </a:p>
+        </p:txBody>
+      </p:sp>
+      <p:sp>
+        <p:nvSpPr>
+          <p:cNvPr id="5" name="Content Placeholder 4"/>
+          <p:cNvSpPr>
+            <a:spLocks noGrp="1"/>
+          </p:cNvSpPr>
+          <p:nvPr>
+            <p:ph idx="1"/>
+          </p:nvPr>
+        </p:nvSpPr>
+        <p:spPr>
+          <a:xfrm>
+            <a:off x="381002" y="2884236"/>
+            <a:ext cx="8410575" cy="1089529"/>
+          </a:xfrm>
+        </p:spPr>
+        <p:txBody>
+          <a:bodyPr anchor="ctr"/>
+          <a:lstStyle/>
+          <a:p>
+            <a:pPr algn="ctr">
+              <a:buNone/>
+            </a:pPr>
+            <a:r>
+              <a:rPr lang="en-US" sz="7200" b="1" dirty="0" smtClean="0"/>
+              <a:t>DEMO</a:t>
+            </a:r>
+            <a:endParaRPr lang="en-US" sz="7200" b="1" dirty="0"/>
           </a:p>
         </p:txBody>
       </p:sp>
@@ -7168,7 +8131,11 @@
           <a:bodyPr/>
           <a:lstStyle/>
           <a:p>
-            <a:endParaRPr lang="en-US"/>
+            <a:r>
+              <a:rPr lang="en-US" b="1" dirty="0" smtClean="0"/>
+              <a:t>Agenda</a:t>
+            </a:r>
+            <a:endParaRPr lang="en-US" b="1" dirty="0"/>
           </a:p>
         </p:txBody>
       </p:sp>
@@ -7182,12 +8149,38 @@
             <p:ph idx="1"/>
           </p:nvPr>
         </p:nvSpPr>
-        <p:spPr/>
+        <p:spPr>
+          <a:xfrm>
+            <a:off x="381002" y="1417638"/>
+            <a:ext cx="8410575" cy="2308324"/>
+          </a:xfrm>
+        </p:spPr>
         <p:txBody>
           <a:bodyPr/>
           <a:lstStyle/>
           <a:p>
-            <a:endParaRPr lang="en-US"/>
+            <a:r>
+              <a:rPr lang="en-US" dirty="0" smtClean="0"/>
+              <a:t>Request Pipeline</a:t>
+            </a:r>
+          </a:p>
+          <a:p>
+            <a:r>
+              <a:rPr lang="en-US" dirty="0" smtClean="0"/>
+              <a:t>Routing Module</a:t>
+            </a:r>
+          </a:p>
+          <a:p>
+            <a:r>
+              <a:rPr lang="en-US" dirty="0" smtClean="0"/>
+              <a:t>Patterns, Defaults and Constraints</a:t>
+            </a:r>
+          </a:p>
+          <a:p>
+            <a:r>
+              <a:rPr lang="en-US" dirty="0" smtClean="0"/>
+              <a:t>Quick Sample: JSON Routing</a:t>
+            </a:r>
           </a:p>
         </p:txBody>
       </p:sp>
@@ -7228,6 +8221,13 @@
   <p:transition>
     <p:fade/>
   </p:transition>
+  <p:timing>
+    <p:tnLst>
+      <p:par>
+        <p:cTn id="1" dur="indefinite" restart="never" nodeType="tmRoot"/>
+      </p:par>
+    </p:tnLst>
+  </p:timing>
 </p:sld>
 </file>
 
@@ -7263,7 +8263,19 @@
           <a:bodyPr/>
           <a:lstStyle/>
           <a:p>
-            <a:endParaRPr lang="en-US"/>
+            <a:r>
+              <a:rPr lang="en-US" b="1" dirty="0" smtClean="0"/>
+              <a:t>(</a:t>
+            </a:r>
+            <a:r>
+              <a:rPr lang="en-US" b="1" dirty="0" smtClean="0"/>
+              <a:t>Simple) </a:t>
+            </a:r>
+            <a:r>
+              <a:rPr lang="en-US" b="1" dirty="0" smtClean="0"/>
+              <a:t>Request Pipeline</a:t>
+            </a:r>
+            <a:endParaRPr lang="en-US" b="1" dirty="0"/>
           </a:p>
         </p:txBody>
       </p:sp>
@@ -7277,12 +8289,59 @@
             <p:ph idx="1"/>
           </p:nvPr>
         </p:nvSpPr>
-        <p:spPr/>
+        <p:spPr>
+          <a:xfrm>
+            <a:off x="381002" y="1417638"/>
+            <a:ext cx="8410575" cy="2308324"/>
+          </a:xfrm>
+        </p:spPr>
         <p:txBody>
           <a:bodyPr/>
           <a:lstStyle/>
           <a:p>
-            <a:endParaRPr lang="en-US"/>
+            <a:pPr marL="514350" indent="-514350">
+              <a:buFont typeface="+mj-lt"/>
+              <a:buAutoNum type="arabicPeriod"/>
+            </a:pPr>
+            <a:r>
+              <a:rPr lang="en-US" dirty="0" smtClean="0"/>
+              <a:t>ASP.NET Receives Request</a:t>
+            </a:r>
+          </a:p>
+          <a:p>
+            <a:pPr marL="514350" indent="-514350">
+              <a:buFont typeface="+mj-lt"/>
+              <a:buAutoNum type="arabicPeriod"/>
+            </a:pPr>
+            <a:r>
+              <a:rPr lang="en-US" dirty="0" smtClean="0"/>
+              <a:t>Routing Module Invoked</a:t>
+            </a:r>
+          </a:p>
+          <a:p>
+            <a:pPr marL="514350" indent="-514350">
+              <a:buFont typeface="+mj-lt"/>
+              <a:buAutoNum type="arabicPeriod"/>
+            </a:pPr>
+            <a:r>
+              <a:rPr lang="en-US" dirty="0" smtClean="0"/>
+              <a:t>Finds Matching Route</a:t>
+            </a:r>
+          </a:p>
+          <a:p>
+            <a:pPr marL="514350" indent="-514350">
+              <a:buFont typeface="+mj-lt"/>
+              <a:buAutoNum type="arabicPeriod"/>
+            </a:pPr>
+            <a:r>
+              <a:rPr lang="en-US" dirty="0" err="1" smtClean="0"/>
+              <a:t>IRouteHandler</a:t>
+            </a:r>
+            <a:r>
+              <a:rPr lang="en-US" dirty="0" smtClean="0"/>
+              <a:t>  is executed</a:t>
+            </a:r>
+            <a:endParaRPr lang="en-US" dirty="0"/>
           </a:p>
         </p:txBody>
       </p:sp>
@@ -7323,6 +8382,1221 @@
   <p:transition>
     <p:fade/>
   </p:transition>
+  <p:timing>
+    <p:tnLst>
+      <p:par>
+        <p:cTn id="1" dur="indefinite" restart="never" nodeType="tmRoot"/>
+      </p:par>
+    </p:tnLst>
+  </p:timing>
+</p:sld>
+</file>
+
+<file path=ppt/slides/slide4.xml><?xml version="1.0" encoding="utf-8"?>
+<p:sld xmlns:a="http://schemas.openxmlformats.org/drawingml/2006/main" xmlns:r="http://schemas.openxmlformats.org/officeDocument/2006/relationships" xmlns:p="http://schemas.openxmlformats.org/presentationml/2006/main">
+  <p:cSld>
+    <p:spTree>
+      <p:nvGrpSpPr>
+        <p:cNvPr id="1" name=""/>
+        <p:cNvGrpSpPr/>
+        <p:nvPr/>
+      </p:nvGrpSpPr>
+      <p:grpSpPr>
+        <a:xfrm>
+          <a:off x="0" y="0"/>
+          <a:ext cx="0" cy="0"/>
+          <a:chOff x="0" y="0"/>
+          <a:chExt cx="0" cy="0"/>
+        </a:xfrm>
+      </p:grpSpPr>
+      <p:sp>
+        <p:nvSpPr>
+          <p:cNvPr id="2" name="Title 1"/>
+          <p:cNvSpPr>
+            <a:spLocks noGrp="1"/>
+          </p:cNvSpPr>
+          <p:nvPr>
+            <p:ph type="title"/>
+          </p:nvPr>
+        </p:nvSpPr>
+        <p:spPr/>
+        <p:txBody>
+          <a:bodyPr/>
+          <a:lstStyle/>
+          <a:p>
+            <a:r>
+              <a:rPr lang="en-US" b="1" dirty="0" smtClean="0"/>
+              <a:t>(Not </a:t>
+            </a:r>
+            <a:r>
+              <a:rPr lang="en-US" b="1" dirty="0" smtClean="0"/>
+              <a:t>Simple) </a:t>
+            </a:r>
+            <a:r>
+              <a:rPr lang="en-US" b="1" dirty="0" smtClean="0"/>
+              <a:t>Request Pipeline</a:t>
+            </a:r>
+            <a:endParaRPr lang="en-US" b="1" dirty="0"/>
+          </a:p>
+        </p:txBody>
+      </p:sp>
+      <p:sp>
+        <p:nvSpPr>
+          <p:cNvPr id="3" name="Content Placeholder 2"/>
+          <p:cNvSpPr>
+            <a:spLocks noGrp="1"/>
+          </p:cNvSpPr>
+          <p:nvPr>
+            <p:ph idx="1"/>
+          </p:nvPr>
+        </p:nvSpPr>
+        <p:spPr>
+          <a:xfrm>
+            <a:off x="381002" y="1417638"/>
+            <a:ext cx="8410575" cy="4967514"/>
+          </a:xfrm>
+        </p:spPr>
+        <p:txBody>
+          <a:bodyPr/>
+          <a:lstStyle/>
+          <a:p>
+            <a:pPr marL="514350" indent="-514350">
+              <a:buFont typeface="+mj-lt"/>
+              <a:buAutoNum type="arabicPeriod"/>
+            </a:pPr>
+            <a:r>
+              <a:rPr lang="en-US" dirty="0" smtClean="0"/>
+              <a:t>ASP.NET Receives Request</a:t>
+            </a:r>
+          </a:p>
+          <a:p>
+            <a:pPr marL="514350" indent="-514350">
+              <a:buFont typeface="+mj-lt"/>
+              <a:buAutoNum type="arabicPeriod"/>
+            </a:pPr>
+            <a:r>
+              <a:rPr lang="en-US" dirty="0" smtClean="0"/>
+              <a:t>Routing Module Invoked</a:t>
+            </a:r>
+          </a:p>
+          <a:p>
+            <a:pPr marL="903287" lvl="1" indent="-514350">
+              <a:buFont typeface="+mj-lt"/>
+              <a:buAutoNum type="arabicPeriod"/>
+            </a:pPr>
+            <a:r>
+              <a:rPr lang="en-US" dirty="0" smtClean="0"/>
+              <a:t>Is for file on disk? Serve it</a:t>
+            </a:r>
+          </a:p>
+          <a:p>
+            <a:pPr marL="514350" indent="-514350">
+              <a:buFont typeface="+mj-lt"/>
+              <a:buAutoNum type="arabicPeriod"/>
+            </a:pPr>
+            <a:r>
+              <a:rPr lang="en-US" dirty="0" smtClean="0"/>
+              <a:t>Finds Matching Route</a:t>
+            </a:r>
+          </a:p>
+          <a:p>
+            <a:pPr marL="903287" lvl="1" indent="-514350">
+              <a:buFont typeface="+mj-lt"/>
+              <a:buAutoNum type="arabicPeriod"/>
+            </a:pPr>
+            <a:r>
+              <a:rPr lang="en-US" dirty="0" smtClean="0"/>
+              <a:t>Does pattern match?</a:t>
+            </a:r>
+          </a:p>
+          <a:p>
+            <a:pPr marL="903287" lvl="1" indent="-514350">
+              <a:buFont typeface="+mj-lt"/>
+              <a:buAutoNum type="arabicPeriod"/>
+            </a:pPr>
+            <a:r>
+              <a:rPr lang="en-US" dirty="0" smtClean="0"/>
+              <a:t>Do defaults help fill parameters?</a:t>
+            </a:r>
+          </a:p>
+          <a:p>
+            <a:pPr marL="903287" lvl="1" indent="-514350">
+              <a:buFont typeface="+mj-lt"/>
+              <a:buAutoNum type="arabicPeriod"/>
+            </a:pPr>
+            <a:r>
+              <a:rPr lang="en-US" dirty="0" smtClean="0"/>
+              <a:t>Are constraints </a:t>
+            </a:r>
+            <a:r>
+              <a:rPr lang="en-US" dirty="0" err="1" smtClean="0"/>
+              <a:t>satified</a:t>
+            </a:r>
+            <a:r>
+              <a:rPr lang="en-US" dirty="0" smtClean="0"/>
+              <a:t>?</a:t>
+            </a:r>
+          </a:p>
+          <a:p>
+            <a:pPr marL="514350" indent="-514350">
+              <a:buFont typeface="+mj-lt"/>
+              <a:buAutoNum type="arabicPeriod"/>
+            </a:pPr>
+            <a:r>
+              <a:rPr lang="en-US" dirty="0" err="1" smtClean="0"/>
+              <a:t>IRouteHandler</a:t>
+            </a:r>
+            <a:r>
+              <a:rPr lang="en-US" dirty="0" smtClean="0"/>
+              <a:t>  is executed</a:t>
+            </a:r>
+          </a:p>
+          <a:p>
+            <a:pPr marL="903287" lvl="1" indent="-514350">
+              <a:buFont typeface="+mj-lt"/>
+              <a:buAutoNum type="arabicPeriod"/>
+            </a:pPr>
+            <a:r>
+              <a:rPr lang="en-US" dirty="0" err="1" smtClean="0"/>
+              <a:t>MvcRouteHandler</a:t>
+            </a:r>
+            <a:r>
+              <a:rPr lang="en-US" dirty="0" smtClean="0"/>
+              <a:t> get to work!</a:t>
+            </a:r>
+            <a:endParaRPr lang="en-US" dirty="0"/>
+          </a:p>
+        </p:txBody>
+      </p:sp>
+      <p:sp>
+        <p:nvSpPr>
+          <p:cNvPr id="4" name="Slide Number Placeholder 3"/>
+          <p:cNvSpPr>
+            <a:spLocks noGrp="1"/>
+          </p:cNvSpPr>
+          <p:nvPr>
+            <p:ph type="sldNum" sz="quarter" idx="10"/>
+          </p:nvPr>
+        </p:nvSpPr>
+        <p:spPr/>
+        <p:txBody>
+          <a:bodyPr/>
+          <a:lstStyle/>
+          <a:p>
+            <a:pPr>
+              <a:defRPr/>
+            </a:pPr>
+            <a:fld id="{B63753EC-566D-40B0-951D-58F31B9256E5}" type="slidenum">
+              <a:rPr lang="en-US" smtClean="0"/>
+              <a:pPr>
+                <a:defRPr/>
+              </a:pPr>
+              <a:t>4</a:t>
+            </a:fld>
+            <a:endParaRPr lang="en-US"/>
+          </a:p>
+        </p:txBody>
+      </p:sp>
+    </p:spTree>
+  </p:cSld>
+  <p:clrMapOvr>
+    <a:masterClrMapping/>
+  </p:clrMapOvr>
+  <p:transition>
+    <p:fade/>
+  </p:transition>
+  <p:timing>
+    <p:tnLst>
+      <p:par>
+        <p:cTn id="1" dur="indefinite" restart="never" nodeType="tmRoot"/>
+      </p:par>
+    </p:tnLst>
+  </p:timing>
+</p:sld>
+</file>
+
+<file path=ppt/slides/slide5.xml><?xml version="1.0" encoding="utf-8"?>
+<p:sld xmlns:a="http://schemas.openxmlformats.org/drawingml/2006/main" xmlns:r="http://schemas.openxmlformats.org/officeDocument/2006/relationships" xmlns:p="http://schemas.openxmlformats.org/presentationml/2006/main">
+  <p:cSld>
+    <p:spTree>
+      <p:nvGrpSpPr>
+        <p:cNvPr id="1" name=""/>
+        <p:cNvGrpSpPr/>
+        <p:nvPr/>
+      </p:nvGrpSpPr>
+      <p:grpSpPr>
+        <a:xfrm>
+          <a:off x="0" y="0"/>
+          <a:ext cx="0" cy="0"/>
+          <a:chOff x="0" y="0"/>
+          <a:chExt cx="0" cy="0"/>
+        </a:xfrm>
+      </p:grpSpPr>
+      <p:sp>
+        <p:nvSpPr>
+          <p:cNvPr id="2" name="Title 1"/>
+          <p:cNvSpPr>
+            <a:spLocks noGrp="1"/>
+          </p:cNvSpPr>
+          <p:nvPr>
+            <p:ph type="title"/>
+          </p:nvPr>
+        </p:nvSpPr>
+        <p:spPr/>
+        <p:txBody>
+          <a:bodyPr/>
+          <a:lstStyle/>
+          <a:p>
+            <a:r>
+              <a:rPr lang="en-US" b="1" dirty="0" smtClean="0"/>
+              <a:t>Routing</a:t>
+            </a:r>
+            <a:r>
+              <a:rPr lang="en-US" dirty="0" smtClean="0"/>
+              <a:t> Module</a:t>
+            </a:r>
+            <a:endParaRPr lang="en-US" dirty="0"/>
+          </a:p>
+        </p:txBody>
+      </p:sp>
+      <p:sp>
+        <p:nvSpPr>
+          <p:cNvPr id="3" name="Content Placeholder 2"/>
+          <p:cNvSpPr>
+            <a:spLocks noGrp="1"/>
+          </p:cNvSpPr>
+          <p:nvPr>
+            <p:ph idx="1"/>
+          </p:nvPr>
+        </p:nvSpPr>
+        <p:spPr>
+          <a:xfrm>
+            <a:off x="381002" y="1417638"/>
+            <a:ext cx="8410575" cy="4007251"/>
+          </a:xfrm>
+        </p:spPr>
+        <p:txBody>
+          <a:bodyPr/>
+          <a:lstStyle/>
+          <a:p>
+            <a:r>
+              <a:rPr lang="en-US" dirty="0" err="1" smtClean="0"/>
+              <a:t>PostResolveRequestCache</a:t>
+            </a:r>
+            <a:endParaRPr lang="en-US" dirty="0" smtClean="0"/>
+          </a:p>
+          <a:p>
+            <a:pPr lvl="1"/>
+            <a:r>
+              <a:rPr lang="en-US" dirty="0" smtClean="0"/>
+              <a:t>Queries </a:t>
+            </a:r>
+            <a:r>
+              <a:rPr lang="en-US" dirty="0" err="1" smtClean="0"/>
+              <a:t>RouteCollection</a:t>
+            </a:r>
+            <a:r>
+              <a:rPr lang="en-US" dirty="0" smtClean="0"/>
+              <a:t> for matching </a:t>
+            </a:r>
+            <a:r>
+              <a:rPr lang="en-US" dirty="0" err="1" smtClean="0"/>
+              <a:t>RouteData</a:t>
+            </a:r>
+            <a:endParaRPr lang="en-US" dirty="0" smtClean="0"/>
+          </a:p>
+          <a:p>
+            <a:pPr lvl="1"/>
+            <a:r>
+              <a:rPr lang="en-US" dirty="0" smtClean="0"/>
+              <a:t>Gets </a:t>
+            </a:r>
+            <a:r>
+              <a:rPr lang="en-US" dirty="0" err="1" smtClean="0"/>
+              <a:t>IRouteHandler</a:t>
+            </a:r>
+            <a:r>
+              <a:rPr lang="en-US" dirty="0" smtClean="0"/>
+              <a:t> from </a:t>
+            </a:r>
+            <a:r>
+              <a:rPr lang="en-US" dirty="0" err="1" smtClean="0"/>
+              <a:t>RouteData</a:t>
+            </a:r>
+            <a:endParaRPr lang="en-US" dirty="0" smtClean="0"/>
+          </a:p>
+          <a:p>
+            <a:pPr lvl="1"/>
+            <a:r>
+              <a:rPr lang="en-US" dirty="0" smtClean="0"/>
+              <a:t>Gets </a:t>
+            </a:r>
+            <a:r>
+              <a:rPr lang="en-US" dirty="0" err="1" smtClean="0"/>
+              <a:t>IHttpHandler</a:t>
+            </a:r>
+            <a:r>
+              <a:rPr lang="en-US" dirty="0" smtClean="0"/>
+              <a:t> from </a:t>
+            </a:r>
+            <a:r>
+              <a:rPr lang="en-US" dirty="0" err="1" smtClean="0"/>
+              <a:t>IRouteHandler</a:t>
+            </a:r>
+            <a:endParaRPr lang="en-US" dirty="0" smtClean="0"/>
+          </a:p>
+          <a:p>
+            <a:pPr lvl="1"/>
+            <a:r>
+              <a:rPr lang="en-US" dirty="0" smtClean="0"/>
+              <a:t>Saves info in </a:t>
+            </a:r>
+            <a:r>
+              <a:rPr lang="en-US" dirty="0" err="1" smtClean="0"/>
+              <a:t>HttpContext.Items</a:t>
+            </a:r>
+            <a:endParaRPr lang="en-US" dirty="0" smtClean="0"/>
+          </a:p>
+          <a:p>
+            <a:pPr lvl="2"/>
+            <a:r>
+              <a:rPr lang="en-US" dirty="0" smtClean="0"/>
+              <a:t>Original Request Path</a:t>
+            </a:r>
+          </a:p>
+          <a:p>
+            <a:pPr lvl="2"/>
+            <a:r>
+              <a:rPr lang="en-US" dirty="0" smtClean="0"/>
+              <a:t>Resolved </a:t>
+            </a:r>
+            <a:r>
+              <a:rPr lang="en-US" dirty="0" err="1" smtClean="0"/>
+              <a:t>IHttpHandler</a:t>
+            </a:r>
+            <a:endParaRPr lang="en-US" dirty="0" smtClean="0"/>
+          </a:p>
+          <a:p>
+            <a:pPr lvl="1"/>
+            <a:r>
+              <a:rPr lang="en-US" dirty="0" smtClean="0"/>
+              <a:t>Rewrites request to UrlHandler.axd</a:t>
+            </a:r>
+          </a:p>
+        </p:txBody>
+      </p:sp>
+      <p:sp>
+        <p:nvSpPr>
+          <p:cNvPr id="4" name="Slide Number Placeholder 3"/>
+          <p:cNvSpPr>
+            <a:spLocks noGrp="1"/>
+          </p:cNvSpPr>
+          <p:nvPr>
+            <p:ph type="sldNum" sz="quarter" idx="10"/>
+          </p:nvPr>
+        </p:nvSpPr>
+        <p:spPr/>
+        <p:txBody>
+          <a:bodyPr/>
+          <a:lstStyle/>
+          <a:p>
+            <a:pPr>
+              <a:defRPr/>
+            </a:pPr>
+            <a:fld id="{B63753EC-566D-40B0-951D-58F31B9256E5}" type="slidenum">
+              <a:rPr lang="en-US" smtClean="0"/>
+              <a:pPr>
+                <a:defRPr/>
+              </a:pPr>
+              <a:t>5</a:t>
+            </a:fld>
+            <a:endParaRPr lang="en-US"/>
+          </a:p>
+        </p:txBody>
+      </p:sp>
+    </p:spTree>
+  </p:cSld>
+  <p:clrMapOvr>
+    <a:masterClrMapping/>
+  </p:clrMapOvr>
+  <p:transition>
+    <p:fade/>
+  </p:transition>
+  <p:timing>
+    <p:tnLst>
+      <p:par>
+        <p:cTn id="1" dur="indefinite" restart="never" nodeType="tmRoot"/>
+      </p:par>
+    </p:tnLst>
+  </p:timing>
+</p:sld>
+</file>
+
+<file path=ppt/slides/slide6.xml><?xml version="1.0" encoding="utf-8"?>
+<p:sld xmlns:a="http://schemas.openxmlformats.org/drawingml/2006/main" xmlns:r="http://schemas.openxmlformats.org/officeDocument/2006/relationships" xmlns:p="http://schemas.openxmlformats.org/presentationml/2006/main">
+  <p:cSld>
+    <p:spTree>
+      <p:nvGrpSpPr>
+        <p:cNvPr id="1" name=""/>
+        <p:cNvGrpSpPr/>
+        <p:nvPr/>
+      </p:nvGrpSpPr>
+      <p:grpSpPr>
+        <a:xfrm>
+          <a:off x="0" y="0"/>
+          <a:ext cx="0" cy="0"/>
+          <a:chOff x="0" y="0"/>
+          <a:chExt cx="0" cy="0"/>
+        </a:xfrm>
+      </p:grpSpPr>
+      <p:sp>
+        <p:nvSpPr>
+          <p:cNvPr id="2" name="Title 1"/>
+          <p:cNvSpPr>
+            <a:spLocks noGrp="1"/>
+          </p:cNvSpPr>
+          <p:nvPr>
+            <p:ph type="title"/>
+          </p:nvPr>
+        </p:nvSpPr>
+        <p:spPr/>
+        <p:txBody>
+          <a:bodyPr/>
+          <a:lstStyle/>
+          <a:p>
+            <a:r>
+              <a:rPr lang="en-US" dirty="0" smtClean="0"/>
+              <a:t>Routing Module</a:t>
+            </a:r>
+            <a:endParaRPr lang="en-US" dirty="0"/>
+          </a:p>
+        </p:txBody>
+      </p:sp>
+      <p:sp>
+        <p:nvSpPr>
+          <p:cNvPr id="3" name="Content Placeholder 2"/>
+          <p:cNvSpPr>
+            <a:spLocks noGrp="1"/>
+          </p:cNvSpPr>
+          <p:nvPr>
+            <p:ph idx="1"/>
+          </p:nvPr>
+        </p:nvSpPr>
+        <p:spPr>
+          <a:xfrm>
+            <a:off x="381002" y="1417638"/>
+            <a:ext cx="8410575" cy="2086725"/>
+          </a:xfrm>
+        </p:spPr>
+        <p:txBody>
+          <a:bodyPr/>
+          <a:lstStyle/>
+          <a:p>
+            <a:r>
+              <a:rPr lang="en-US" dirty="0" err="1" smtClean="0"/>
+              <a:t>PostMapRequestHandler</a:t>
+            </a:r>
+            <a:endParaRPr lang="en-US" dirty="0" smtClean="0"/>
+          </a:p>
+          <a:p>
+            <a:pPr lvl="1"/>
+            <a:r>
+              <a:rPr lang="en-US" dirty="0" smtClean="0"/>
+              <a:t>Pulls data from </a:t>
+            </a:r>
+            <a:r>
+              <a:rPr lang="en-US" dirty="0" err="1" smtClean="0"/>
+              <a:t>HttpContext.Items</a:t>
+            </a:r>
+            <a:endParaRPr lang="en-US" dirty="0" smtClean="0"/>
+          </a:p>
+          <a:p>
+            <a:pPr lvl="1"/>
+            <a:r>
+              <a:rPr lang="en-US" dirty="0" smtClean="0"/>
+              <a:t>Sets </a:t>
+            </a:r>
+            <a:r>
+              <a:rPr lang="en-US" dirty="0" err="1" smtClean="0"/>
+              <a:t>IHttpHandler</a:t>
+            </a:r>
+            <a:r>
+              <a:rPr lang="en-US" dirty="0" smtClean="0"/>
+              <a:t> to </a:t>
+            </a:r>
+            <a:r>
+              <a:rPr lang="en-US" dirty="0" err="1" smtClean="0"/>
+              <a:t>HttpContext.Handler</a:t>
+            </a:r>
+            <a:endParaRPr lang="en-US" dirty="0" smtClean="0"/>
+          </a:p>
+          <a:p>
+            <a:pPr lvl="1"/>
+            <a:r>
+              <a:rPr lang="en-US" dirty="0" err="1" smtClean="0"/>
+              <a:t>Rewrite’s</a:t>
+            </a:r>
+            <a:r>
+              <a:rPr lang="en-US" dirty="0" smtClean="0"/>
+              <a:t> request to original path</a:t>
+            </a:r>
+          </a:p>
+        </p:txBody>
+      </p:sp>
+      <p:sp>
+        <p:nvSpPr>
+          <p:cNvPr id="4" name="Slide Number Placeholder 3"/>
+          <p:cNvSpPr>
+            <a:spLocks noGrp="1"/>
+          </p:cNvSpPr>
+          <p:nvPr>
+            <p:ph type="sldNum" sz="quarter" idx="10"/>
+          </p:nvPr>
+        </p:nvSpPr>
+        <p:spPr/>
+        <p:txBody>
+          <a:bodyPr/>
+          <a:lstStyle/>
+          <a:p>
+            <a:pPr>
+              <a:defRPr/>
+            </a:pPr>
+            <a:fld id="{B63753EC-566D-40B0-951D-58F31B9256E5}" type="slidenum">
+              <a:rPr lang="en-US" smtClean="0"/>
+              <a:pPr>
+                <a:defRPr/>
+              </a:pPr>
+              <a:t>6</a:t>
+            </a:fld>
+            <a:endParaRPr lang="en-US"/>
+          </a:p>
+        </p:txBody>
+      </p:sp>
+    </p:spTree>
+  </p:cSld>
+  <p:clrMapOvr>
+    <a:masterClrMapping/>
+  </p:clrMapOvr>
+  <p:transition>
+    <p:fade/>
+  </p:transition>
+  <p:timing>
+    <p:tnLst>
+      <p:par>
+        <p:cTn id="1" dur="indefinite" restart="never" nodeType="tmRoot"/>
+      </p:par>
+    </p:tnLst>
+  </p:timing>
+</p:sld>
+</file>
+
+<file path=ppt/slides/slide7.xml><?xml version="1.0" encoding="utf-8"?>
+<p:sld xmlns:a="http://schemas.openxmlformats.org/drawingml/2006/main" xmlns:r="http://schemas.openxmlformats.org/officeDocument/2006/relationships" xmlns:p="http://schemas.openxmlformats.org/presentationml/2006/main">
+  <p:cSld>
+    <p:spTree>
+      <p:nvGrpSpPr>
+        <p:cNvPr id="1" name=""/>
+        <p:cNvGrpSpPr/>
+        <p:nvPr/>
+      </p:nvGrpSpPr>
+      <p:grpSpPr>
+        <a:xfrm>
+          <a:off x="0" y="0"/>
+          <a:ext cx="0" cy="0"/>
+          <a:chOff x="0" y="0"/>
+          <a:chExt cx="0" cy="0"/>
+        </a:xfrm>
+      </p:grpSpPr>
+      <p:sp>
+        <p:nvSpPr>
+          <p:cNvPr id="2" name="Title 1"/>
+          <p:cNvSpPr>
+            <a:spLocks noGrp="1"/>
+          </p:cNvSpPr>
+          <p:nvPr>
+            <p:ph type="title"/>
+          </p:nvPr>
+        </p:nvSpPr>
+        <p:spPr/>
+        <p:txBody>
+          <a:bodyPr/>
+          <a:lstStyle/>
+          <a:p>
+            <a:r>
+              <a:rPr lang="en-US" b="1" dirty="0" smtClean="0"/>
+              <a:t>Patterns</a:t>
+            </a:r>
+            <a:endParaRPr lang="en-US" b="1" dirty="0"/>
+          </a:p>
+        </p:txBody>
+      </p:sp>
+      <p:sp>
+        <p:nvSpPr>
+          <p:cNvPr id="3" name="Content Placeholder 2"/>
+          <p:cNvSpPr>
+            <a:spLocks noGrp="1"/>
+          </p:cNvSpPr>
+          <p:nvPr>
+            <p:ph idx="1"/>
+          </p:nvPr>
+        </p:nvSpPr>
+        <p:spPr>
+          <a:xfrm>
+            <a:off x="381002" y="1417638"/>
+            <a:ext cx="8410575" cy="3859518"/>
+          </a:xfrm>
+        </p:spPr>
+        <p:txBody>
+          <a:bodyPr/>
+          <a:lstStyle/>
+          <a:p>
+            <a:r>
+              <a:rPr lang="en-US" dirty="0" smtClean="0"/>
+              <a:t>Structure of the URL</a:t>
+            </a:r>
+          </a:p>
+          <a:p>
+            <a:pPr lvl="1"/>
+            <a:r>
+              <a:rPr lang="en-US" b="1" dirty="0" smtClean="0"/>
+              <a:t>http://example.com/display/user/joe</a:t>
+            </a:r>
+          </a:p>
+          <a:p>
+            <a:pPr lvl="1"/>
+            <a:r>
+              <a:rPr lang="en-US" b="1" dirty="0" smtClean="0"/>
+              <a:t>http://example.com/{controller}/{action}/{id}</a:t>
+            </a:r>
+          </a:p>
+          <a:p>
+            <a:pPr lvl="2">
+              <a:buNone/>
+            </a:pPr>
+            <a:r>
+              <a:rPr lang="en-US" dirty="0" smtClean="0">
+                <a:latin typeface="Consolas" pitchFamily="49" charset="0"/>
+                <a:cs typeface="Consolas" pitchFamily="49" charset="0"/>
+              </a:rPr>
+              <a:t>	</a:t>
+            </a:r>
+          </a:p>
+          <a:p>
+            <a:pPr lvl="2">
+              <a:buNone/>
+            </a:pPr>
+            <a:r>
+              <a:rPr lang="en-US" dirty="0" smtClean="0">
+                <a:latin typeface="Consolas" pitchFamily="49" charset="0"/>
+                <a:cs typeface="Consolas" pitchFamily="49" charset="0"/>
+              </a:rPr>
+              <a:t>	</a:t>
+            </a:r>
+            <a:r>
+              <a:rPr lang="en-US" dirty="0" smtClean="0">
+                <a:latin typeface="Consolas" pitchFamily="49" charset="0"/>
+                <a:cs typeface="Consolas" pitchFamily="49" charset="0"/>
+              </a:rPr>
+              <a:t>{controller} – display</a:t>
+            </a:r>
+          </a:p>
+          <a:p>
+            <a:pPr lvl="2">
+              <a:buNone/>
+            </a:pPr>
+            <a:r>
+              <a:rPr lang="en-US" dirty="0" smtClean="0">
+                <a:latin typeface="Consolas" pitchFamily="49" charset="0"/>
+                <a:cs typeface="Consolas" pitchFamily="49" charset="0"/>
+              </a:rPr>
+              <a:t>	{action} – user</a:t>
+            </a:r>
+          </a:p>
+          <a:p>
+            <a:pPr lvl="2">
+              <a:buNone/>
+            </a:pPr>
+            <a:r>
+              <a:rPr lang="en-US" dirty="0" smtClean="0">
+                <a:latin typeface="Consolas" pitchFamily="49" charset="0"/>
+                <a:cs typeface="Consolas" pitchFamily="49" charset="0"/>
+              </a:rPr>
+              <a:t>	{id} – </a:t>
+            </a:r>
+            <a:r>
+              <a:rPr lang="en-US" dirty="0" err="1" smtClean="0">
+                <a:latin typeface="Consolas" pitchFamily="49" charset="0"/>
+                <a:cs typeface="Consolas" pitchFamily="49" charset="0"/>
+              </a:rPr>
+              <a:t>joe</a:t>
+            </a:r>
+            <a:endParaRPr lang="en-US" dirty="0" smtClean="0">
+              <a:latin typeface="Consolas" pitchFamily="49" charset="0"/>
+              <a:cs typeface="Consolas" pitchFamily="49" charset="0"/>
+            </a:endParaRPr>
+          </a:p>
+          <a:p>
+            <a:pPr lvl="1"/>
+            <a:endParaRPr lang="en-US" dirty="0"/>
+          </a:p>
+        </p:txBody>
+      </p:sp>
+      <p:sp>
+        <p:nvSpPr>
+          <p:cNvPr id="4" name="Slide Number Placeholder 3"/>
+          <p:cNvSpPr>
+            <a:spLocks noGrp="1"/>
+          </p:cNvSpPr>
+          <p:nvPr>
+            <p:ph type="sldNum" sz="quarter" idx="10"/>
+          </p:nvPr>
+        </p:nvSpPr>
+        <p:spPr/>
+        <p:txBody>
+          <a:bodyPr/>
+          <a:lstStyle/>
+          <a:p>
+            <a:pPr>
+              <a:defRPr/>
+            </a:pPr>
+            <a:fld id="{B63753EC-566D-40B0-951D-58F31B9256E5}" type="slidenum">
+              <a:rPr lang="en-US" smtClean="0"/>
+              <a:pPr>
+                <a:defRPr/>
+              </a:pPr>
+              <a:t>7</a:t>
+            </a:fld>
+            <a:endParaRPr lang="en-US"/>
+          </a:p>
+        </p:txBody>
+      </p:sp>
+    </p:spTree>
+  </p:cSld>
+  <p:clrMapOvr>
+    <a:masterClrMapping/>
+  </p:clrMapOvr>
+  <p:transition>
+    <p:fade/>
+  </p:transition>
+  <p:timing>
+    <p:tnLst>
+      <p:par>
+        <p:cTn id="1" dur="indefinite" restart="never" nodeType="tmRoot"/>
+      </p:par>
+    </p:tnLst>
+  </p:timing>
+</p:sld>
+</file>
+
+<file path=ppt/slides/slide8.xml><?xml version="1.0" encoding="utf-8"?>
+<p:sld xmlns:a="http://schemas.openxmlformats.org/drawingml/2006/main" xmlns:r="http://schemas.openxmlformats.org/officeDocument/2006/relationships" xmlns:p="http://schemas.openxmlformats.org/presentationml/2006/main">
+  <p:cSld>
+    <p:spTree>
+      <p:nvGrpSpPr>
+        <p:cNvPr id="1" name=""/>
+        <p:cNvGrpSpPr/>
+        <p:nvPr/>
+      </p:nvGrpSpPr>
+      <p:grpSpPr>
+        <a:xfrm>
+          <a:off x="0" y="0"/>
+          <a:ext cx="0" cy="0"/>
+          <a:chOff x="0" y="0"/>
+          <a:chExt cx="0" cy="0"/>
+        </a:xfrm>
+      </p:grpSpPr>
+      <p:sp>
+        <p:nvSpPr>
+          <p:cNvPr id="2" name="Title 1"/>
+          <p:cNvSpPr>
+            <a:spLocks noGrp="1"/>
+          </p:cNvSpPr>
+          <p:nvPr>
+            <p:ph type="title"/>
+          </p:nvPr>
+        </p:nvSpPr>
+        <p:spPr/>
+        <p:txBody>
+          <a:bodyPr/>
+          <a:lstStyle/>
+          <a:p>
+            <a:r>
+              <a:rPr lang="en-US" dirty="0" smtClean="0"/>
+              <a:t>Patterns</a:t>
+            </a:r>
+            <a:endParaRPr lang="en-US" dirty="0"/>
+          </a:p>
+        </p:txBody>
+      </p:sp>
+      <p:sp>
+        <p:nvSpPr>
+          <p:cNvPr id="3" name="Content Placeholder 2"/>
+          <p:cNvSpPr>
+            <a:spLocks noGrp="1"/>
+          </p:cNvSpPr>
+          <p:nvPr>
+            <p:ph idx="1"/>
+          </p:nvPr>
+        </p:nvSpPr>
+        <p:spPr>
+          <a:xfrm>
+            <a:off x="381002" y="1417638"/>
+            <a:ext cx="8410575" cy="3859518"/>
+          </a:xfrm>
+        </p:spPr>
+        <p:txBody>
+          <a:bodyPr/>
+          <a:lstStyle/>
+          <a:p>
+            <a:r>
+              <a:rPr lang="en-US" dirty="0" smtClean="0"/>
+              <a:t>Can “catch all” remainder pieces</a:t>
+            </a:r>
+          </a:p>
+          <a:p>
+            <a:pPr lvl="1"/>
+            <a:r>
+              <a:rPr lang="en-US" b="1" dirty="0" smtClean="0"/>
+              <a:t>http://example.com/foo/bar/spaz/widget</a:t>
+            </a:r>
+          </a:p>
+          <a:p>
+            <a:pPr lvl="1"/>
+            <a:r>
+              <a:rPr lang="en-US" b="1" dirty="0" smtClean="0"/>
+              <a:t>http://example.com/{controller}/{action}/{*all}</a:t>
+            </a:r>
+          </a:p>
+          <a:p>
+            <a:pPr lvl="2">
+              <a:buNone/>
+            </a:pPr>
+            <a:r>
+              <a:rPr lang="en-US" dirty="0" smtClean="0">
+                <a:latin typeface="Consolas" pitchFamily="49" charset="0"/>
+                <a:cs typeface="Consolas" pitchFamily="49" charset="0"/>
+              </a:rPr>
+              <a:t>	</a:t>
+            </a:r>
+          </a:p>
+          <a:p>
+            <a:pPr lvl="2">
+              <a:buNone/>
+            </a:pPr>
+            <a:r>
+              <a:rPr lang="en-US" dirty="0" smtClean="0">
+                <a:latin typeface="Consolas" pitchFamily="49" charset="0"/>
+                <a:cs typeface="Consolas" pitchFamily="49" charset="0"/>
+              </a:rPr>
+              <a:t>	</a:t>
+            </a:r>
+            <a:r>
+              <a:rPr lang="en-US" dirty="0" smtClean="0">
+                <a:latin typeface="Consolas" pitchFamily="49" charset="0"/>
+                <a:cs typeface="Consolas" pitchFamily="49" charset="0"/>
+              </a:rPr>
+              <a:t>{controller} – </a:t>
+            </a:r>
+            <a:r>
+              <a:rPr lang="en-US" dirty="0" err="1" smtClean="0">
+                <a:latin typeface="Consolas" pitchFamily="49" charset="0"/>
+                <a:cs typeface="Consolas" pitchFamily="49" charset="0"/>
+              </a:rPr>
+              <a:t>foo</a:t>
+            </a:r>
+            <a:endParaRPr lang="en-US" dirty="0" smtClean="0">
+              <a:latin typeface="Consolas" pitchFamily="49" charset="0"/>
+              <a:cs typeface="Consolas" pitchFamily="49" charset="0"/>
+            </a:endParaRPr>
+          </a:p>
+          <a:p>
+            <a:pPr lvl="2">
+              <a:buNone/>
+            </a:pPr>
+            <a:r>
+              <a:rPr lang="en-US" dirty="0" smtClean="0">
+                <a:latin typeface="Consolas" pitchFamily="49" charset="0"/>
+                <a:cs typeface="Consolas" pitchFamily="49" charset="0"/>
+              </a:rPr>
+              <a:t>	{action} – bar</a:t>
+            </a:r>
+          </a:p>
+          <a:p>
+            <a:pPr lvl="2">
+              <a:buNone/>
+            </a:pPr>
+            <a:r>
+              <a:rPr lang="en-US" dirty="0" smtClean="0">
+                <a:latin typeface="Consolas" pitchFamily="49" charset="0"/>
+                <a:cs typeface="Consolas" pitchFamily="49" charset="0"/>
+              </a:rPr>
+              <a:t>	{*all} – </a:t>
+            </a:r>
+            <a:r>
+              <a:rPr lang="en-US" dirty="0" err="1" smtClean="0">
+                <a:latin typeface="Consolas" pitchFamily="49" charset="0"/>
+                <a:cs typeface="Consolas" pitchFamily="49" charset="0"/>
+              </a:rPr>
+              <a:t>spaz</a:t>
+            </a:r>
+            <a:r>
+              <a:rPr lang="en-US" dirty="0" smtClean="0">
+                <a:latin typeface="Consolas" pitchFamily="49" charset="0"/>
+                <a:cs typeface="Consolas" pitchFamily="49" charset="0"/>
+              </a:rPr>
+              <a:t>/widge</a:t>
+            </a:r>
+            <a:r>
+              <a:rPr lang="en-US" i="1" dirty="0" smtClean="0">
+                <a:latin typeface="Consolas" pitchFamily="49" charset="0"/>
+                <a:cs typeface="Consolas" pitchFamily="49" charset="0"/>
+              </a:rPr>
+              <a:t>t</a:t>
+            </a:r>
+          </a:p>
+          <a:p>
+            <a:pPr lvl="1"/>
+            <a:endParaRPr lang="en-US" dirty="0"/>
+          </a:p>
+        </p:txBody>
+      </p:sp>
+      <p:sp>
+        <p:nvSpPr>
+          <p:cNvPr id="4" name="Slide Number Placeholder 3"/>
+          <p:cNvSpPr>
+            <a:spLocks noGrp="1"/>
+          </p:cNvSpPr>
+          <p:nvPr>
+            <p:ph type="sldNum" sz="quarter" idx="10"/>
+          </p:nvPr>
+        </p:nvSpPr>
+        <p:spPr/>
+        <p:txBody>
+          <a:bodyPr/>
+          <a:lstStyle/>
+          <a:p>
+            <a:pPr>
+              <a:defRPr/>
+            </a:pPr>
+            <a:fld id="{B63753EC-566D-40B0-951D-58F31B9256E5}" type="slidenum">
+              <a:rPr lang="en-US" smtClean="0"/>
+              <a:pPr>
+                <a:defRPr/>
+              </a:pPr>
+              <a:t>8</a:t>
+            </a:fld>
+            <a:endParaRPr lang="en-US"/>
+          </a:p>
+        </p:txBody>
+      </p:sp>
+    </p:spTree>
+  </p:cSld>
+  <p:clrMapOvr>
+    <a:masterClrMapping/>
+  </p:clrMapOvr>
+  <p:transition>
+    <p:fade/>
+  </p:transition>
+  <p:timing>
+    <p:tnLst>
+      <p:par>
+        <p:cTn id="1" dur="indefinite" restart="never" nodeType="tmRoot"/>
+      </p:par>
+    </p:tnLst>
+  </p:timing>
+</p:sld>
+</file>
+
+<file path=ppt/slides/slide9.xml><?xml version="1.0" encoding="utf-8"?>
+<p:sld xmlns:a="http://schemas.openxmlformats.org/drawingml/2006/main" xmlns:r="http://schemas.openxmlformats.org/officeDocument/2006/relationships" xmlns:p="http://schemas.openxmlformats.org/presentationml/2006/main">
+  <p:cSld>
+    <p:spTree>
+      <p:nvGrpSpPr>
+        <p:cNvPr id="1" name=""/>
+        <p:cNvGrpSpPr/>
+        <p:nvPr/>
+      </p:nvGrpSpPr>
+      <p:grpSpPr>
+        <a:xfrm>
+          <a:off x="0" y="0"/>
+          <a:ext cx="0" cy="0"/>
+          <a:chOff x="0" y="0"/>
+          <a:chExt cx="0" cy="0"/>
+        </a:xfrm>
+      </p:grpSpPr>
+      <p:sp>
+        <p:nvSpPr>
+          <p:cNvPr id="2" name="Title 1"/>
+          <p:cNvSpPr>
+            <a:spLocks noGrp="1"/>
+          </p:cNvSpPr>
+          <p:nvPr>
+            <p:ph type="title"/>
+          </p:nvPr>
+        </p:nvSpPr>
+        <p:spPr/>
+        <p:txBody>
+          <a:bodyPr/>
+          <a:lstStyle/>
+          <a:p>
+            <a:r>
+              <a:rPr lang="en-US" b="1" dirty="0" smtClean="0"/>
+              <a:t>Defaults</a:t>
+            </a:r>
+            <a:endParaRPr lang="en-US" b="1" dirty="0"/>
+          </a:p>
+        </p:txBody>
+      </p:sp>
+      <p:sp>
+        <p:nvSpPr>
+          <p:cNvPr id="3" name="Content Placeholder 2"/>
+          <p:cNvSpPr>
+            <a:spLocks noGrp="1"/>
+          </p:cNvSpPr>
+          <p:nvPr>
+            <p:ph idx="1"/>
+          </p:nvPr>
+        </p:nvSpPr>
+        <p:spPr>
+          <a:xfrm>
+            <a:off x="381002" y="1417638"/>
+            <a:ext cx="8410575" cy="3268587"/>
+          </a:xfrm>
+        </p:spPr>
+        <p:txBody>
+          <a:bodyPr/>
+          <a:lstStyle/>
+          <a:p>
+            <a:r>
+              <a:rPr lang="en-US" dirty="0" smtClean="0"/>
+              <a:t>Applied when not found in pattern</a:t>
+            </a:r>
+          </a:p>
+          <a:p>
+            <a:pPr lvl="1"/>
+            <a:r>
+              <a:rPr lang="en-US" b="1" dirty="0" smtClean="0"/>
+              <a:t>http://example.com/{controller}/{action}/{id</a:t>
+            </a:r>
+            <a:r>
+              <a:rPr lang="en-US" b="1" dirty="0" smtClean="0"/>
+              <a:t>}</a:t>
+            </a:r>
+          </a:p>
+          <a:p>
+            <a:pPr lvl="2">
+              <a:buNone/>
+            </a:pPr>
+            <a:r>
+              <a:rPr lang="en-US" b="1" dirty="0" smtClean="0"/>
+              <a:t>	</a:t>
+            </a:r>
+          </a:p>
+          <a:p>
+            <a:pPr lvl="2">
+              <a:buNone/>
+            </a:pPr>
+            <a:r>
+              <a:rPr lang="en-US" b="1" dirty="0" smtClean="0">
+                <a:latin typeface="Consolas" pitchFamily="49" charset="0"/>
+                <a:cs typeface="Consolas" pitchFamily="49" charset="0"/>
+              </a:rPr>
+              <a:t>	</a:t>
+            </a:r>
+            <a:r>
+              <a:rPr lang="en-US" dirty="0" smtClean="0">
+                <a:latin typeface="Consolas" pitchFamily="49" charset="0"/>
+                <a:cs typeface="Consolas" pitchFamily="49" charset="0"/>
+              </a:rPr>
+              <a:t>new { </a:t>
+            </a:r>
+          </a:p>
+          <a:p>
+            <a:pPr lvl="3">
+              <a:buNone/>
+            </a:pPr>
+            <a:r>
+              <a:rPr lang="en-US" sz="2400" dirty="0" smtClean="0">
+                <a:latin typeface="Consolas" pitchFamily="49" charset="0"/>
+                <a:cs typeface="Consolas" pitchFamily="49" charset="0"/>
+              </a:rPr>
+              <a:t>	controller = “home”,</a:t>
+            </a:r>
+          </a:p>
+          <a:p>
+            <a:pPr lvl="3">
+              <a:buNone/>
+            </a:pPr>
+            <a:r>
+              <a:rPr lang="en-US" sz="2400" dirty="0" smtClean="0">
+                <a:latin typeface="Consolas" pitchFamily="49" charset="0"/>
+                <a:cs typeface="Consolas" pitchFamily="49" charset="0"/>
+              </a:rPr>
+              <a:t>	action = “index”,</a:t>
+            </a:r>
+          </a:p>
+          <a:p>
+            <a:pPr lvl="3">
+              <a:buNone/>
+            </a:pPr>
+            <a:r>
+              <a:rPr lang="en-US" sz="2400" dirty="0" smtClean="0">
+                <a:latin typeface="Consolas" pitchFamily="49" charset="0"/>
+                <a:cs typeface="Consolas" pitchFamily="49" charset="0"/>
+              </a:rPr>
+              <a:t>	id = “” }; </a:t>
+            </a:r>
+            <a:endParaRPr lang="en-US" sz="2400" dirty="0">
+              <a:latin typeface="Consolas" pitchFamily="49" charset="0"/>
+              <a:cs typeface="Consolas" pitchFamily="49" charset="0"/>
+            </a:endParaRPr>
+          </a:p>
+        </p:txBody>
+      </p:sp>
+      <p:sp>
+        <p:nvSpPr>
+          <p:cNvPr id="4" name="Slide Number Placeholder 3"/>
+          <p:cNvSpPr>
+            <a:spLocks noGrp="1"/>
+          </p:cNvSpPr>
+          <p:nvPr>
+            <p:ph type="sldNum" sz="quarter" idx="10"/>
+          </p:nvPr>
+        </p:nvSpPr>
+        <p:spPr/>
+        <p:txBody>
+          <a:bodyPr/>
+          <a:lstStyle/>
+          <a:p>
+            <a:pPr>
+              <a:defRPr/>
+            </a:pPr>
+            <a:fld id="{B63753EC-566D-40B0-951D-58F31B9256E5}" type="slidenum">
+              <a:rPr lang="en-US" smtClean="0"/>
+              <a:pPr>
+                <a:defRPr/>
+              </a:pPr>
+              <a:t>9</a:t>
+            </a:fld>
+            <a:endParaRPr lang="en-US"/>
+          </a:p>
+        </p:txBody>
+      </p:sp>
+    </p:spTree>
+  </p:cSld>
+  <p:clrMapOvr>
+    <a:masterClrMapping/>
+  </p:clrMapOvr>
+  <p:transition>
+    <p:fade/>
+  </p:transition>
+  <p:timing>
+    <p:tnLst>
+      <p:par>
+        <p:cTn id="1" dur="indefinite" restart="never" nodeType="tmRoot"/>
+      </p:par>
+    </p:tnLst>
+  </p:timing>
 </p:sld>
 </file>
 

</xml_diff>